<commit_message>
add tests for Select and Next command
</commit_message>
<xml_diff>
--- a/docs/diagrams/SelectNextCommand1.pptx
+++ b/docs/diagrams/SelectNextCommand1.pptx
@@ -261,7 +261,7 @@
           <a:p>
             <a:fld id="{03EC4E3E-8101-482F-A883-8B55DAFF7C07}" type="datetimeFigureOut">
               <a:rPr lang="en-SG" smtClean="0"/>
-              <a:t>29/10/2018</a:t>
+              <a:t>30/10/2018</a:t>
             </a:fld>
             <a:endParaRPr lang="en-SG"/>
           </a:p>
@@ -461,7 +461,7 @@
           <a:p>
             <a:fld id="{03EC4E3E-8101-482F-A883-8B55DAFF7C07}" type="datetimeFigureOut">
               <a:rPr lang="en-SG" smtClean="0"/>
-              <a:t>29/10/2018</a:t>
+              <a:t>30/10/2018</a:t>
             </a:fld>
             <a:endParaRPr lang="en-SG"/>
           </a:p>
@@ -671,7 +671,7 @@
           <a:p>
             <a:fld id="{03EC4E3E-8101-482F-A883-8B55DAFF7C07}" type="datetimeFigureOut">
               <a:rPr lang="en-SG" smtClean="0"/>
-              <a:t>29/10/2018</a:t>
+              <a:t>30/10/2018</a:t>
             </a:fld>
             <a:endParaRPr lang="en-SG"/>
           </a:p>
@@ -871,7 +871,7 @@
           <a:p>
             <a:fld id="{03EC4E3E-8101-482F-A883-8B55DAFF7C07}" type="datetimeFigureOut">
               <a:rPr lang="en-SG" smtClean="0"/>
-              <a:t>29/10/2018</a:t>
+              <a:t>30/10/2018</a:t>
             </a:fld>
             <a:endParaRPr lang="en-SG"/>
           </a:p>
@@ -1147,7 +1147,7 @@
           <a:p>
             <a:fld id="{03EC4E3E-8101-482F-A883-8B55DAFF7C07}" type="datetimeFigureOut">
               <a:rPr lang="en-SG" smtClean="0"/>
-              <a:t>29/10/2018</a:t>
+              <a:t>30/10/2018</a:t>
             </a:fld>
             <a:endParaRPr lang="en-SG"/>
           </a:p>
@@ -1415,7 +1415,7 @@
           <a:p>
             <a:fld id="{03EC4E3E-8101-482F-A883-8B55DAFF7C07}" type="datetimeFigureOut">
               <a:rPr lang="en-SG" smtClean="0"/>
-              <a:t>29/10/2018</a:t>
+              <a:t>30/10/2018</a:t>
             </a:fld>
             <a:endParaRPr lang="en-SG"/>
           </a:p>
@@ -1830,7 +1830,7 @@
           <a:p>
             <a:fld id="{03EC4E3E-8101-482F-A883-8B55DAFF7C07}" type="datetimeFigureOut">
               <a:rPr lang="en-SG" smtClean="0"/>
-              <a:t>29/10/2018</a:t>
+              <a:t>30/10/2018</a:t>
             </a:fld>
             <a:endParaRPr lang="en-SG"/>
           </a:p>
@@ -1972,7 +1972,7 @@
           <a:p>
             <a:fld id="{03EC4E3E-8101-482F-A883-8B55DAFF7C07}" type="datetimeFigureOut">
               <a:rPr lang="en-SG" smtClean="0"/>
-              <a:t>29/10/2018</a:t>
+              <a:t>30/10/2018</a:t>
             </a:fld>
             <a:endParaRPr lang="en-SG"/>
           </a:p>
@@ -2085,7 +2085,7 @@
           <a:p>
             <a:fld id="{03EC4E3E-8101-482F-A883-8B55DAFF7C07}" type="datetimeFigureOut">
               <a:rPr lang="en-SG" smtClean="0"/>
-              <a:t>29/10/2018</a:t>
+              <a:t>30/10/2018</a:t>
             </a:fld>
             <a:endParaRPr lang="en-SG"/>
           </a:p>
@@ -2398,7 +2398,7 @@
           <a:p>
             <a:fld id="{03EC4E3E-8101-482F-A883-8B55DAFF7C07}" type="datetimeFigureOut">
               <a:rPr lang="en-SG" smtClean="0"/>
-              <a:t>29/10/2018</a:t>
+              <a:t>30/10/2018</a:t>
             </a:fld>
             <a:endParaRPr lang="en-SG"/>
           </a:p>
@@ -2687,7 +2687,7 @@
           <a:p>
             <a:fld id="{03EC4E3E-8101-482F-A883-8B55DAFF7C07}" type="datetimeFigureOut">
               <a:rPr lang="en-SG" smtClean="0"/>
-              <a:t>29/10/2018</a:t>
+              <a:t>30/10/2018</a:t>
             </a:fld>
             <a:endParaRPr lang="en-SG"/>
           </a:p>
@@ -2930,7 +2930,7 @@
           <a:p>
             <a:fld id="{03EC4E3E-8101-482F-A883-8B55DAFF7C07}" type="datetimeFigureOut">
               <a:rPr lang="en-SG" smtClean="0"/>
-              <a:t>29/10/2018</a:t>
+              <a:t>30/10/2018</a:t>
             </a:fld>
             <a:endParaRPr lang="en-SG"/>
           </a:p>

</xml_diff>